<commit_message>
Week 4 Presentations Added
</commit_message>
<xml_diff>
--- a/presentations/Data Structures and Algorithms.pptx
+++ b/presentations/Data Structures and Algorithms.pptx
@@ -9113,6 +9113,13 @@
   <p:clrMapOvr>
     <a:masterClrMapping/>
   </p:clrMapOvr>
+  <p:timing>
+    <p:tnLst>
+      <p:par>
+        <p:cTn id="1" dur="indefinite" restart="never" nodeType="tmRoot"/>
+      </p:par>
+    </p:tnLst>
+  </p:timing>
 </p:sld>
 </file>
 
@@ -9240,6 +9247,13 @@
   <p:clrMapOvr>
     <a:masterClrMapping/>
   </p:clrMapOvr>
+  <p:timing>
+    <p:tnLst>
+      <p:par>
+        <p:cTn id="1" dur="indefinite" restart="never" nodeType="tmRoot"/>
+      </p:par>
+    </p:tnLst>
+  </p:timing>
 </p:sld>
 </file>
 
@@ -9397,6 +9411,13 @@
   <p:clrMapOvr>
     <a:masterClrMapping/>
   </p:clrMapOvr>
+  <p:timing>
+    <p:tnLst>
+      <p:par>
+        <p:cTn id="1" dur="indefinite" restart="never" nodeType="tmRoot"/>
+      </p:par>
+    </p:tnLst>
+  </p:timing>
 </p:sld>
 </file>
 
@@ -9541,6 +9562,13 @@
   <p:clrMapOvr>
     <a:masterClrMapping/>
   </p:clrMapOvr>
+  <p:timing>
+    <p:tnLst>
+      <p:par>
+        <p:cTn id="1" dur="indefinite" restart="never" nodeType="tmRoot"/>
+      </p:par>
+    </p:tnLst>
+  </p:timing>
 </p:sld>
 </file>
 
@@ -9672,6 +9700,13 @@
   <p:clrMapOvr>
     <a:masterClrMapping/>
   </p:clrMapOvr>
+  <p:timing>
+    <p:tnLst>
+      <p:par>
+        <p:cTn id="1" dur="indefinite" restart="never" nodeType="tmRoot"/>
+      </p:par>
+    </p:tnLst>
+  </p:timing>
 </p:sld>
 </file>
 
@@ -9833,6 +9868,13 @@
   <p:clrMapOvr>
     <a:masterClrMapping/>
   </p:clrMapOvr>
+  <p:timing>
+    <p:tnLst>
+      <p:par>
+        <p:cTn id="1" dur="indefinite" restart="never" nodeType="tmRoot"/>
+      </p:par>
+    </p:tnLst>
+  </p:timing>
 </p:sld>
 </file>
 
@@ -9950,6 +9992,13 @@
   <p:clrMapOvr>
     <a:masterClrMapping/>
   </p:clrMapOvr>
+  <p:timing>
+    <p:tnLst>
+      <p:par>
+        <p:cTn id="1" dur="indefinite" restart="never" nodeType="tmRoot"/>
+      </p:par>
+    </p:tnLst>
+  </p:timing>
 </p:sld>
 </file>
 
@@ -10258,6 +10307,13 @@
   <p:clrMapOvr>
     <a:masterClrMapping/>
   </p:clrMapOvr>
+  <p:timing>
+    <p:tnLst>
+      <p:par>
+        <p:cTn id="1" dur="indefinite" restart="never" nodeType="tmRoot"/>
+      </p:par>
+    </p:tnLst>
+  </p:timing>
 </p:sld>
 </file>
 
@@ -10522,6 +10578,13 @@
   <p:clrMapOvr>
     <a:masterClrMapping/>
   </p:clrMapOvr>
+  <p:timing>
+    <p:tnLst>
+      <p:par>
+        <p:cTn id="1" dur="indefinite" restart="never" nodeType="tmRoot"/>
+      </p:par>
+    </p:tnLst>
+  </p:timing>
 </p:sld>
 </file>
 
@@ -10658,6 +10721,13 @@
   <p:clrMapOvr>
     <a:masterClrMapping/>
   </p:clrMapOvr>
+  <p:timing>
+    <p:tnLst>
+      <p:par>
+        <p:cTn id="1" dur="indefinite" restart="never" nodeType="tmRoot"/>
+      </p:par>
+    </p:tnLst>
+  </p:timing>
 </p:sld>
 </file>
 
@@ -10860,6 +10930,13 @@
   <p:clrMapOvr>
     <a:masterClrMapping/>
   </p:clrMapOvr>
+  <p:timing>
+    <p:tnLst>
+      <p:par>
+        <p:cTn id="1" dur="indefinite" restart="never" nodeType="tmRoot"/>
+      </p:par>
+    </p:tnLst>
+  </p:timing>
 </p:sld>
 </file>
 
@@ -11126,6 +11203,13 @@
   <p:clrMapOvr>
     <a:masterClrMapping/>
   </p:clrMapOvr>
+  <p:timing>
+    <p:tnLst>
+      <p:par>
+        <p:cTn id="1" dur="indefinite" restart="never" nodeType="tmRoot"/>
+      </p:par>
+    </p:tnLst>
+  </p:timing>
 </p:sld>
 </file>
 
@@ -11426,6 +11510,13 @@
   <p:clrMapOvr>
     <a:masterClrMapping/>
   </p:clrMapOvr>
+  <p:timing>
+    <p:tnLst>
+      <p:par>
+        <p:cTn id="1" dur="indefinite" restart="never" nodeType="tmRoot"/>
+      </p:par>
+    </p:tnLst>
+  </p:timing>
 </p:sld>
 </file>
 
@@ -11742,6 +11833,13 @@
   <p:clrMapOvr>
     <a:masterClrMapping/>
   </p:clrMapOvr>
+  <p:timing>
+    <p:tnLst>
+      <p:par>
+        <p:cTn id="1" dur="indefinite" restart="never" nodeType="tmRoot"/>
+      </p:par>
+    </p:tnLst>
+  </p:timing>
 </p:sld>
 </file>
 
@@ -12512,6 +12610,13 @@
   <p:clrMapOvr>
     <a:masterClrMapping/>
   </p:clrMapOvr>
+  <p:timing>
+    <p:tnLst>
+      <p:par>
+        <p:cTn id="1" dur="indefinite" restart="never" nodeType="tmRoot"/>
+      </p:par>
+    </p:tnLst>
+  </p:timing>
 </p:sld>
 </file>
 
@@ -12931,10 +13036,9 @@
           </a:p>
           <a:p>
             <a:r>
-              <a:rPr lang="en-US"/>
+              <a:rPr lang="en-US" dirty="0"/>
               <a:t>Eclipse Demo</a:t>
             </a:r>
-            <a:endParaRPr lang="en-US" dirty="0"/>
           </a:p>
         </p:txBody>
       </p:sp>
@@ -13716,6 +13820,13 @@
   <p:clrMapOvr>
     <a:masterClrMapping/>
   </p:clrMapOvr>
+  <p:timing>
+    <p:tnLst>
+      <p:par>
+        <p:cTn id="1" dur="indefinite" restart="never" nodeType="tmRoot"/>
+      </p:par>
+    </p:tnLst>
+  </p:timing>
 </p:sld>
 </file>
 
@@ -13847,6 +13958,13 @@
   <p:clrMapOvr>
     <a:masterClrMapping/>
   </p:clrMapOvr>
+  <p:timing>
+    <p:tnLst>
+      <p:par>
+        <p:cTn id="1" dur="indefinite" restart="never" nodeType="tmRoot"/>
+      </p:par>
+    </p:tnLst>
+  </p:timing>
 </p:sld>
 </file>
 
@@ -14270,6 +14388,13 @@
   <p:clrMapOvr>
     <a:masterClrMapping/>
   </p:clrMapOvr>
+  <p:timing>
+    <p:tnLst>
+      <p:par>
+        <p:cTn id="1" dur="indefinite" restart="never" nodeType="tmRoot"/>
+      </p:par>
+    </p:tnLst>
+  </p:timing>
 </p:sld>
 </file>
 
@@ -14346,6 +14471,13 @@
   <p:clrMapOvr>
     <a:masterClrMapping/>
   </p:clrMapOvr>
+  <p:timing>
+    <p:tnLst>
+      <p:par>
+        <p:cTn id="1" dur="indefinite" restart="never" nodeType="tmRoot"/>
+      </p:par>
+    </p:tnLst>
+  </p:timing>
 </p:sld>
 </file>
 
@@ -14451,6 +14583,13 @@
   <p:clrMapOvr>
     <a:masterClrMapping/>
   </p:clrMapOvr>
+  <p:timing>
+    <p:tnLst>
+      <p:par>
+        <p:cTn id="1" dur="indefinite" restart="never" nodeType="tmRoot"/>
+      </p:par>
+    </p:tnLst>
+  </p:timing>
 </p:sld>
 </file>
 

</xml_diff>